<commit_message>
Update 2-Estructuras de Control de Flujo y Funciones.pptx
</commit_message>
<xml_diff>
--- a/2-Estructuras de Control de Flujo y Funciones.pptx
+++ b/2-Estructuras de Control de Flujo y Funciones.pptx
@@ -15,6 +15,13 @@
     <p:sldId id="265" r:id="rId9"/>
     <p:sldId id="266" r:id="rId10"/>
     <p:sldId id="267" r:id="rId11"/>
+    <p:sldId id="268" r:id="rId12"/>
+    <p:sldId id="271" r:id="rId13"/>
+    <p:sldId id="270" r:id="rId14"/>
+    <p:sldId id="272" r:id="rId15"/>
+    <p:sldId id="273" r:id="rId16"/>
+    <p:sldId id="274" r:id="rId17"/>
+    <p:sldId id="275" r:id="rId18"/>
   </p:sldIdLst>
   <p:sldSz cx="12192000" cy="6858000"/>
   <p:notesSz cx="6858000" cy="9144000"/>
@@ -312,9 +319,9 @@
           <a:p>
             <a:fld id="{EA6719AD-8A49-45FF-82FD-8CF1CBB70D63}" type="datetimeFigureOut">
               <a:rPr lang="es-ES" smtClean="0"/>
-              <a:t>29/04/2025</a:t>
+              <a:t>05/05/2025</a:t>
             </a:fld>
-            <a:endParaRPr lang="es-ES"/>
+            <a:endParaRPr lang="es-ES" dirty="0"/>
           </a:p>
         </p:txBody>
       </p:sp>
@@ -333,7 +340,7 @@
           <a:bodyPr/>
           <a:lstStyle/>
           <a:p>
-            <a:endParaRPr lang="es-ES"/>
+            <a:endParaRPr lang="es-ES" dirty="0"/>
           </a:p>
         </p:txBody>
       </p:sp>
@@ -356,7 +363,7 @@
               <a:rPr lang="es-ES" smtClean="0"/>
               <a:t>‹Nº›</a:t>
             </a:fld>
-            <a:endParaRPr lang="es-ES"/>
+            <a:endParaRPr lang="es-ES" dirty="0"/>
           </a:p>
         </p:txBody>
       </p:sp>
@@ -668,7 +675,7 @@
           </a:lstStyle>
           <a:p>
             <a:r>
-              <a:rPr lang="es-ES"/>
+              <a:rPr lang="es-ES" dirty="0"/>
               <a:t>Haga clic en el icono para agregar una imagen</a:t>
             </a:r>
             <a:endParaRPr lang="en-US" dirty="0"/>
@@ -748,9 +755,9 @@
           <a:p>
             <a:fld id="{EA6719AD-8A49-45FF-82FD-8CF1CBB70D63}" type="datetimeFigureOut">
               <a:rPr lang="es-ES" smtClean="0"/>
-              <a:t>29/04/2025</a:t>
+              <a:t>05/05/2025</a:t>
             </a:fld>
-            <a:endParaRPr lang="es-ES"/>
+            <a:endParaRPr lang="es-ES" dirty="0"/>
           </a:p>
         </p:txBody>
       </p:sp>
@@ -769,7 +776,7 @@
           <a:bodyPr/>
           <a:lstStyle/>
           <a:p>
-            <a:endParaRPr lang="es-ES"/>
+            <a:endParaRPr lang="es-ES" dirty="0"/>
           </a:p>
         </p:txBody>
       </p:sp>
@@ -792,7 +799,7 @@
               <a:rPr lang="es-ES" smtClean="0"/>
               <a:t>‹Nº›</a:t>
             </a:fld>
-            <a:endParaRPr lang="es-ES"/>
+            <a:endParaRPr lang="es-ES" dirty="0"/>
           </a:p>
         </p:txBody>
       </p:sp>
@@ -998,9 +1005,9 @@
           <a:p>
             <a:fld id="{EA6719AD-8A49-45FF-82FD-8CF1CBB70D63}" type="datetimeFigureOut">
               <a:rPr lang="es-ES" smtClean="0"/>
-              <a:t>29/04/2025</a:t>
+              <a:t>05/05/2025</a:t>
             </a:fld>
-            <a:endParaRPr lang="es-ES"/>
+            <a:endParaRPr lang="es-ES" dirty="0"/>
           </a:p>
         </p:txBody>
       </p:sp>
@@ -1019,7 +1026,7 @@
           <a:bodyPr/>
           <a:lstStyle/>
           <a:p>
-            <a:endParaRPr lang="es-ES"/>
+            <a:endParaRPr lang="es-ES" dirty="0"/>
           </a:p>
         </p:txBody>
       </p:sp>
@@ -1042,7 +1049,7 @@
               <a:rPr lang="es-ES" smtClean="0"/>
               <a:t>‹Nº›</a:t>
             </a:fld>
-            <a:endParaRPr lang="es-ES"/>
+            <a:endParaRPr lang="es-ES" dirty="0"/>
           </a:p>
         </p:txBody>
       </p:sp>
@@ -1306,9 +1313,9 @@
           <a:p>
             <a:fld id="{EA6719AD-8A49-45FF-82FD-8CF1CBB70D63}" type="datetimeFigureOut">
               <a:rPr lang="es-ES" smtClean="0"/>
-              <a:t>29/04/2025</a:t>
+              <a:t>05/05/2025</a:t>
             </a:fld>
-            <a:endParaRPr lang="es-ES"/>
+            <a:endParaRPr lang="es-ES" dirty="0"/>
           </a:p>
         </p:txBody>
       </p:sp>
@@ -1327,7 +1334,7 @@
           <a:bodyPr/>
           <a:lstStyle/>
           <a:p>
-            <a:endParaRPr lang="es-ES"/>
+            <a:endParaRPr lang="es-ES" dirty="0"/>
           </a:p>
         </p:txBody>
       </p:sp>
@@ -1350,7 +1357,7 @@
               <a:rPr lang="es-ES" smtClean="0"/>
               <a:t>‹Nº›</a:t>
             </a:fld>
-            <a:endParaRPr lang="es-ES"/>
+            <a:endParaRPr lang="es-ES" dirty="0"/>
           </a:p>
         </p:txBody>
       </p:sp>
@@ -1624,9 +1631,9 @@
           <a:p>
             <a:fld id="{EA6719AD-8A49-45FF-82FD-8CF1CBB70D63}" type="datetimeFigureOut">
               <a:rPr lang="es-ES" smtClean="0"/>
-              <a:t>29/04/2025</a:t>
+              <a:t>05/05/2025</a:t>
             </a:fld>
-            <a:endParaRPr lang="es-ES"/>
+            <a:endParaRPr lang="es-ES" dirty="0"/>
           </a:p>
         </p:txBody>
       </p:sp>
@@ -1645,7 +1652,7 @@
           <a:bodyPr/>
           <a:lstStyle/>
           <a:p>
-            <a:endParaRPr lang="es-ES"/>
+            <a:endParaRPr lang="es-ES" dirty="0"/>
           </a:p>
         </p:txBody>
       </p:sp>
@@ -1668,7 +1675,7 @@
               <a:rPr lang="es-ES" smtClean="0"/>
               <a:t>‹Nº›</a:t>
             </a:fld>
-            <a:endParaRPr lang="es-ES"/>
+            <a:endParaRPr lang="es-ES" dirty="0"/>
           </a:p>
         </p:txBody>
       </p:sp>
@@ -1926,9 +1933,9 @@
           <a:p>
             <a:fld id="{EA6719AD-8A49-45FF-82FD-8CF1CBB70D63}" type="datetimeFigureOut">
               <a:rPr lang="es-ES" smtClean="0"/>
-              <a:t>29/04/2025</a:t>
+              <a:t>05/05/2025</a:t>
             </a:fld>
-            <a:endParaRPr lang="es-ES"/>
+            <a:endParaRPr lang="es-ES" dirty="0"/>
           </a:p>
         </p:txBody>
       </p:sp>
@@ -1947,7 +1954,7 @@
           <a:bodyPr/>
           <a:lstStyle/>
           <a:p>
-            <a:endParaRPr lang="es-ES"/>
+            <a:endParaRPr lang="es-ES" dirty="0"/>
           </a:p>
         </p:txBody>
       </p:sp>
@@ -1970,7 +1977,7 @@
               <a:rPr lang="es-ES" smtClean="0"/>
               <a:t>‹Nº›</a:t>
             </a:fld>
-            <a:endParaRPr lang="es-ES"/>
+            <a:endParaRPr lang="es-ES" dirty="0"/>
           </a:p>
         </p:txBody>
       </p:sp>
@@ -2293,9 +2300,9 @@
           <a:p>
             <a:fld id="{EA6719AD-8A49-45FF-82FD-8CF1CBB70D63}" type="datetimeFigureOut">
               <a:rPr lang="es-ES" smtClean="0"/>
-              <a:t>29/04/2025</a:t>
+              <a:t>05/05/2025</a:t>
             </a:fld>
-            <a:endParaRPr lang="es-ES"/>
+            <a:endParaRPr lang="es-ES" dirty="0"/>
           </a:p>
         </p:txBody>
       </p:sp>
@@ -2314,7 +2321,7 @@
           <a:bodyPr/>
           <a:lstStyle/>
           <a:p>
-            <a:endParaRPr lang="es-ES"/>
+            <a:endParaRPr lang="es-ES" dirty="0"/>
           </a:p>
         </p:txBody>
       </p:sp>
@@ -2337,7 +2344,7 @@
               <a:rPr lang="es-ES" smtClean="0"/>
               <a:t>‹Nº›</a:t>
             </a:fld>
-            <a:endParaRPr lang="es-ES"/>
+            <a:endParaRPr lang="es-ES" dirty="0"/>
           </a:p>
         </p:txBody>
       </p:sp>
@@ -2467,9 +2474,9 @@
           <a:p>
             <a:fld id="{EA6719AD-8A49-45FF-82FD-8CF1CBB70D63}" type="datetimeFigureOut">
               <a:rPr lang="es-ES" smtClean="0"/>
-              <a:t>29/04/2025</a:t>
+              <a:t>05/05/2025</a:t>
             </a:fld>
-            <a:endParaRPr lang="es-ES"/>
+            <a:endParaRPr lang="es-ES" dirty="0"/>
           </a:p>
         </p:txBody>
       </p:sp>
@@ -2488,7 +2495,7 @@
           <a:bodyPr/>
           <a:lstStyle/>
           <a:p>
-            <a:endParaRPr lang="es-ES"/>
+            <a:endParaRPr lang="es-ES" dirty="0"/>
           </a:p>
         </p:txBody>
       </p:sp>
@@ -2511,7 +2518,7 @@
               <a:rPr lang="es-ES" smtClean="0"/>
               <a:t>‹Nº›</a:t>
             </a:fld>
-            <a:endParaRPr lang="es-ES"/>
+            <a:endParaRPr lang="es-ES" dirty="0"/>
           </a:p>
         </p:txBody>
       </p:sp>
@@ -2647,9 +2654,9 @@
           <a:p>
             <a:fld id="{EA6719AD-8A49-45FF-82FD-8CF1CBB70D63}" type="datetimeFigureOut">
               <a:rPr lang="es-ES" smtClean="0"/>
-              <a:t>29/04/2025</a:t>
+              <a:t>05/05/2025</a:t>
             </a:fld>
-            <a:endParaRPr lang="es-ES"/>
+            <a:endParaRPr lang="es-ES" dirty="0"/>
           </a:p>
         </p:txBody>
       </p:sp>
@@ -2668,7 +2675,7 @@
           <a:bodyPr/>
           <a:lstStyle/>
           <a:p>
-            <a:endParaRPr lang="es-ES"/>
+            <a:endParaRPr lang="es-ES" dirty="0"/>
           </a:p>
         </p:txBody>
       </p:sp>
@@ -2691,7 +2698,7 @@
               <a:rPr lang="es-ES" smtClean="0"/>
               <a:t>‹Nº›</a:t>
             </a:fld>
-            <a:endParaRPr lang="es-ES"/>
+            <a:endParaRPr lang="es-ES" dirty="0"/>
           </a:p>
         </p:txBody>
       </p:sp>
@@ -2817,9 +2824,9 @@
           <a:p>
             <a:fld id="{EA6719AD-8A49-45FF-82FD-8CF1CBB70D63}" type="datetimeFigureOut">
               <a:rPr lang="es-ES" smtClean="0"/>
-              <a:t>29/04/2025</a:t>
+              <a:t>05/05/2025</a:t>
             </a:fld>
-            <a:endParaRPr lang="es-ES"/>
+            <a:endParaRPr lang="es-ES" dirty="0"/>
           </a:p>
         </p:txBody>
       </p:sp>
@@ -2838,7 +2845,7 @@
           <a:bodyPr/>
           <a:lstStyle/>
           <a:p>
-            <a:endParaRPr lang="es-ES"/>
+            <a:endParaRPr lang="es-ES" dirty="0"/>
           </a:p>
         </p:txBody>
       </p:sp>
@@ -2861,7 +2868,7 @@
               <a:rPr lang="es-ES" smtClean="0"/>
               <a:t>‹Nº›</a:t>
             </a:fld>
-            <a:endParaRPr lang="es-ES"/>
+            <a:endParaRPr lang="es-ES" dirty="0"/>
           </a:p>
         </p:txBody>
       </p:sp>
@@ -3067,9 +3074,9 @@
           <a:p>
             <a:fld id="{EA6719AD-8A49-45FF-82FD-8CF1CBB70D63}" type="datetimeFigureOut">
               <a:rPr lang="es-ES" smtClean="0"/>
-              <a:t>29/04/2025</a:t>
+              <a:t>05/05/2025</a:t>
             </a:fld>
-            <a:endParaRPr lang="es-ES"/>
+            <a:endParaRPr lang="es-ES" dirty="0"/>
           </a:p>
         </p:txBody>
       </p:sp>
@@ -3088,7 +3095,7 @@
           <a:bodyPr/>
           <a:lstStyle/>
           <a:p>
-            <a:endParaRPr lang="es-ES"/>
+            <a:endParaRPr lang="es-ES" dirty="0"/>
           </a:p>
         </p:txBody>
       </p:sp>
@@ -3111,7 +3118,7 @@
               <a:rPr lang="es-ES" smtClean="0"/>
               <a:t>‹Nº›</a:t>
             </a:fld>
-            <a:endParaRPr lang="es-ES"/>
+            <a:endParaRPr lang="es-ES" dirty="0"/>
           </a:p>
         </p:txBody>
       </p:sp>
@@ -3303,9 +3310,9 @@
           <a:p>
             <a:fld id="{EA6719AD-8A49-45FF-82FD-8CF1CBB70D63}" type="datetimeFigureOut">
               <a:rPr lang="es-ES" smtClean="0"/>
-              <a:t>29/04/2025</a:t>
+              <a:t>05/05/2025</a:t>
             </a:fld>
-            <a:endParaRPr lang="es-ES"/>
+            <a:endParaRPr lang="es-ES" dirty="0"/>
           </a:p>
         </p:txBody>
       </p:sp>
@@ -3324,7 +3331,7 @@
           <a:bodyPr/>
           <a:lstStyle/>
           <a:p>
-            <a:endParaRPr lang="es-ES"/>
+            <a:endParaRPr lang="es-ES" dirty="0"/>
           </a:p>
         </p:txBody>
       </p:sp>
@@ -3347,7 +3354,7 @@
               <a:rPr lang="es-ES" smtClean="0"/>
               <a:t>‹Nº›</a:t>
             </a:fld>
-            <a:endParaRPr lang="es-ES"/>
+            <a:endParaRPr lang="es-ES" dirty="0"/>
           </a:p>
         </p:txBody>
       </p:sp>
@@ -3685,9 +3692,9 @@
           <a:p>
             <a:fld id="{EA6719AD-8A49-45FF-82FD-8CF1CBB70D63}" type="datetimeFigureOut">
               <a:rPr lang="es-ES" smtClean="0"/>
-              <a:t>29/04/2025</a:t>
+              <a:t>05/05/2025</a:t>
             </a:fld>
-            <a:endParaRPr lang="es-ES"/>
+            <a:endParaRPr lang="es-ES" dirty="0"/>
           </a:p>
         </p:txBody>
       </p:sp>
@@ -3706,7 +3713,7 @@
           <a:bodyPr/>
           <a:lstStyle/>
           <a:p>
-            <a:endParaRPr lang="es-ES"/>
+            <a:endParaRPr lang="es-ES" dirty="0"/>
           </a:p>
         </p:txBody>
       </p:sp>
@@ -3729,7 +3736,7 @@
               <a:rPr lang="es-ES" smtClean="0"/>
               <a:t>‹Nº›</a:t>
             </a:fld>
-            <a:endParaRPr lang="es-ES"/>
+            <a:endParaRPr lang="es-ES" dirty="0"/>
           </a:p>
         </p:txBody>
       </p:sp>
@@ -3803,9 +3810,9 @@
           <a:p>
             <a:fld id="{EA6719AD-8A49-45FF-82FD-8CF1CBB70D63}" type="datetimeFigureOut">
               <a:rPr lang="es-ES" smtClean="0"/>
-              <a:t>29/04/2025</a:t>
+              <a:t>05/05/2025</a:t>
             </a:fld>
-            <a:endParaRPr lang="es-ES"/>
+            <a:endParaRPr lang="es-ES" dirty="0"/>
           </a:p>
         </p:txBody>
       </p:sp>
@@ -3824,7 +3831,7 @@
           <a:bodyPr/>
           <a:lstStyle/>
           <a:p>
-            <a:endParaRPr lang="es-ES"/>
+            <a:endParaRPr lang="es-ES" dirty="0"/>
           </a:p>
         </p:txBody>
       </p:sp>
@@ -3847,7 +3854,7 @@
               <a:rPr lang="es-ES" smtClean="0"/>
               <a:t>‹Nº›</a:t>
             </a:fld>
-            <a:endParaRPr lang="es-ES"/>
+            <a:endParaRPr lang="es-ES" dirty="0"/>
           </a:p>
         </p:txBody>
       </p:sp>
@@ -3898,9 +3905,9 @@
           <a:p>
             <a:fld id="{EA6719AD-8A49-45FF-82FD-8CF1CBB70D63}" type="datetimeFigureOut">
               <a:rPr lang="es-ES" smtClean="0"/>
-              <a:t>29/04/2025</a:t>
+              <a:t>05/05/2025</a:t>
             </a:fld>
-            <a:endParaRPr lang="es-ES"/>
+            <a:endParaRPr lang="es-ES" dirty="0"/>
           </a:p>
         </p:txBody>
       </p:sp>
@@ -3919,7 +3926,7 @@
           <a:bodyPr/>
           <a:lstStyle/>
           <a:p>
-            <a:endParaRPr lang="es-ES"/>
+            <a:endParaRPr lang="es-ES" dirty="0"/>
           </a:p>
         </p:txBody>
       </p:sp>
@@ -3942,7 +3949,7 @@
               <a:rPr lang="es-ES" smtClean="0"/>
               <a:t>‹Nº›</a:t>
             </a:fld>
-            <a:endParaRPr lang="es-ES"/>
+            <a:endParaRPr lang="es-ES" dirty="0"/>
           </a:p>
         </p:txBody>
       </p:sp>
@@ -4153,9 +4160,9 @@
           <a:p>
             <a:fld id="{EA6719AD-8A49-45FF-82FD-8CF1CBB70D63}" type="datetimeFigureOut">
               <a:rPr lang="es-ES" smtClean="0"/>
-              <a:t>29/04/2025</a:t>
+              <a:t>05/05/2025</a:t>
             </a:fld>
-            <a:endParaRPr lang="es-ES"/>
+            <a:endParaRPr lang="es-ES" dirty="0"/>
           </a:p>
         </p:txBody>
       </p:sp>
@@ -4174,7 +4181,7 @@
           <a:bodyPr/>
           <a:lstStyle/>
           <a:p>
-            <a:endParaRPr lang="es-ES"/>
+            <a:endParaRPr lang="es-ES" dirty="0"/>
           </a:p>
         </p:txBody>
       </p:sp>
@@ -4197,7 +4204,7 @@
               <a:rPr lang="es-ES" smtClean="0"/>
               <a:t>‹Nº›</a:t>
             </a:fld>
-            <a:endParaRPr lang="es-ES"/>
+            <a:endParaRPr lang="es-ES" dirty="0"/>
           </a:p>
         </p:txBody>
       </p:sp>
@@ -4345,7 +4352,7 @@
           </a:lstStyle>
           <a:p>
             <a:r>
-              <a:rPr lang="es-ES"/>
+              <a:rPr lang="es-ES" dirty="0"/>
               <a:t>Haga clic en el icono para agregar una imagen</a:t>
             </a:r>
             <a:endParaRPr lang="en-US" dirty="0"/>
@@ -4436,9 +4443,9 @@
           <a:p>
             <a:fld id="{EA6719AD-8A49-45FF-82FD-8CF1CBB70D63}" type="datetimeFigureOut">
               <a:rPr lang="es-ES" smtClean="0"/>
-              <a:t>29/04/2025</a:t>
+              <a:t>05/05/2025</a:t>
             </a:fld>
-            <a:endParaRPr lang="es-ES"/>
+            <a:endParaRPr lang="es-ES" dirty="0"/>
           </a:p>
         </p:txBody>
       </p:sp>
@@ -4457,7 +4464,7 @@
           <a:bodyPr/>
           <a:lstStyle/>
           <a:p>
-            <a:endParaRPr lang="es-ES"/>
+            <a:endParaRPr lang="es-ES" dirty="0"/>
           </a:p>
         </p:txBody>
       </p:sp>
@@ -4480,7 +4487,7 @@
               <a:rPr lang="es-ES" smtClean="0"/>
               <a:t>‹Nº›</a:t>
             </a:fld>
-            <a:endParaRPr lang="es-ES"/>
+            <a:endParaRPr lang="es-ES" dirty="0"/>
           </a:p>
         </p:txBody>
       </p:sp>
@@ -4842,9 +4849,9 @@
           <a:p>
             <a:fld id="{EA6719AD-8A49-45FF-82FD-8CF1CBB70D63}" type="datetimeFigureOut">
               <a:rPr lang="es-ES" smtClean="0"/>
-              <a:t>29/04/2025</a:t>
+              <a:t>05/05/2025</a:t>
             </a:fld>
-            <a:endParaRPr lang="es-ES"/>
+            <a:endParaRPr lang="es-ES" dirty="0"/>
           </a:p>
         </p:txBody>
       </p:sp>
@@ -4883,7 +4890,7 @@
             </a:lvl1pPr>
           </a:lstStyle>
           <a:p>
-            <a:endParaRPr lang="es-ES"/>
+            <a:endParaRPr lang="es-ES" dirty="0"/>
           </a:p>
         </p:txBody>
       </p:sp>
@@ -4926,7 +4933,7 @@
               <a:rPr lang="es-ES" smtClean="0"/>
               <a:t>‹Nº›</a:t>
             </a:fld>
-            <a:endParaRPr lang="es-ES"/>
+            <a:endParaRPr lang="es-ES" dirty="0"/>
           </a:p>
         </p:txBody>
       </p:sp>
@@ -5486,6 +5493,1176 @@
 </p:sld>
 </file>
 
+<file path=ppt/slides/slide11.xml><?xml version="1.0" encoding="utf-8"?>
+<p:sld xmlns:a="http://schemas.openxmlformats.org/drawingml/2006/main" xmlns:r="http://schemas.openxmlformats.org/officeDocument/2006/relationships" xmlns:p="http://schemas.openxmlformats.org/presentationml/2006/main">
+  <p:cSld>
+    <p:spTree>
+      <p:nvGrpSpPr>
+        <p:cNvPr id="1" name=""/>
+        <p:cNvGrpSpPr/>
+        <p:nvPr/>
+      </p:nvGrpSpPr>
+      <p:grpSpPr>
+        <a:xfrm>
+          <a:off x="0" y="0"/>
+          <a:ext cx="0" cy="0"/>
+          <a:chOff x="0" y="0"/>
+          <a:chExt cx="0" cy="0"/>
+        </a:xfrm>
+      </p:grpSpPr>
+      <p:sp>
+        <p:nvSpPr>
+          <p:cNvPr id="2" name="Título 1">
+            <a:extLst>
+              <a:ext uri="{FF2B5EF4-FFF2-40B4-BE49-F238E27FC236}">
+                <a16:creationId xmlns:a16="http://schemas.microsoft.com/office/drawing/2014/main" id="{0D6C6DDA-732C-40CD-8D46-65D2ECA5E0C7}"/>
+              </a:ext>
+            </a:extLst>
+          </p:cNvPr>
+          <p:cNvSpPr>
+            <a:spLocks noGrp="1"/>
+          </p:cNvSpPr>
+          <p:nvPr>
+            <p:ph type="title"/>
+          </p:nvPr>
+        </p:nvSpPr>
+        <p:spPr>
+          <a:xfrm>
+            <a:off x="585601" y="31873"/>
+            <a:ext cx="8534400" cy="1507067"/>
+          </a:xfrm>
+        </p:spPr>
+        <p:txBody>
+          <a:bodyPr/>
+          <a:lstStyle/>
+          <a:p>
+            <a:r>
+              <a:rPr lang="es-ES" dirty="0"/>
+              <a:t>Como crear una función?</a:t>
+            </a:r>
+          </a:p>
+        </p:txBody>
+      </p:sp>
+      <p:sp>
+        <p:nvSpPr>
+          <p:cNvPr id="3" name="Marcador de contenido 2">
+            <a:extLst>
+              <a:ext uri="{FF2B5EF4-FFF2-40B4-BE49-F238E27FC236}">
+                <a16:creationId xmlns:a16="http://schemas.microsoft.com/office/drawing/2014/main" id="{9F78E88E-E5EE-4B7C-9BE7-2144B9865A62}"/>
+              </a:ext>
+            </a:extLst>
+          </p:cNvPr>
+          <p:cNvSpPr>
+            <a:spLocks noGrp="1"/>
+          </p:cNvSpPr>
+          <p:nvPr>
+            <p:ph idx="1"/>
+          </p:nvPr>
+        </p:nvSpPr>
+        <p:spPr>
+          <a:xfrm>
+            <a:off x="3262500" y="1621366"/>
+            <a:ext cx="8534400" cy="3615267"/>
+          </a:xfrm>
+        </p:spPr>
+        <p:txBody>
+          <a:bodyPr/>
+          <a:lstStyle/>
+          <a:p>
+            <a:r>
+              <a:rPr lang="es-ES" dirty="0"/>
+              <a:t>No hay mucho que explicar, aplicamos la función y sumamos n1 y n2</a:t>
+            </a:r>
+          </a:p>
+        </p:txBody>
+      </p:sp>
+      <p:pic>
+        <p:nvPicPr>
+          <p:cNvPr id="5" name="Imagen 4">
+            <a:extLst>
+              <a:ext uri="{FF2B5EF4-FFF2-40B4-BE49-F238E27FC236}">
+                <a16:creationId xmlns:a16="http://schemas.microsoft.com/office/drawing/2014/main" id="{5D0FF954-00EF-44F2-B547-D2C960202BC9}"/>
+              </a:ext>
+            </a:extLst>
+          </p:cNvPr>
+          <p:cNvPicPr>
+            <a:picLocks noChangeAspect="1"/>
+          </p:cNvPicPr>
+          <p:nvPr/>
+        </p:nvPicPr>
+        <p:blipFill rotWithShape="1">
+          <a:blip r:embed="rId2"/>
+          <a:srcRect b="79409"/>
+          <a:stretch/>
+        </p:blipFill>
+        <p:spPr>
+          <a:xfrm>
+            <a:off x="585601" y="3052050"/>
+            <a:ext cx="2676899" cy="515904"/>
+          </a:xfrm>
+          <a:prstGeom prst="rect">
+            <a:avLst/>
+          </a:prstGeom>
+        </p:spPr>
+      </p:pic>
+      <p:pic>
+        <p:nvPicPr>
+          <p:cNvPr id="7" name="Imagen 6">
+            <a:extLst>
+              <a:ext uri="{FF2B5EF4-FFF2-40B4-BE49-F238E27FC236}">
+                <a16:creationId xmlns:a16="http://schemas.microsoft.com/office/drawing/2014/main" id="{317680C5-429A-4CEC-B5AC-5B751A1AFC47}"/>
+              </a:ext>
+            </a:extLst>
+          </p:cNvPr>
+          <p:cNvPicPr>
+            <a:picLocks noChangeAspect="1"/>
+          </p:cNvPicPr>
+          <p:nvPr/>
+        </p:nvPicPr>
+        <p:blipFill>
+          <a:blip r:embed="rId3"/>
+          <a:stretch>
+            <a:fillRect/>
+          </a:stretch>
+        </p:blipFill>
+        <p:spPr>
+          <a:xfrm>
+            <a:off x="585601" y="4000171"/>
+            <a:ext cx="1390844" cy="695422"/>
+          </a:xfrm>
+          <a:prstGeom prst="rect">
+            <a:avLst/>
+          </a:prstGeom>
+        </p:spPr>
+      </p:pic>
+    </p:spTree>
+    <p:extLst>
+      <p:ext uri="{BB962C8B-B14F-4D97-AF65-F5344CB8AC3E}">
+        <p14:creationId xmlns:p14="http://schemas.microsoft.com/office/powerpoint/2010/main" val="953113317"/>
+      </p:ext>
+    </p:extLst>
+  </p:cSld>
+  <p:clrMapOvr>
+    <a:masterClrMapping/>
+  </p:clrMapOvr>
+</p:sld>
+</file>
+
+<file path=ppt/slides/slide12.xml><?xml version="1.0" encoding="utf-8"?>
+<p:sld xmlns:a="http://schemas.openxmlformats.org/drawingml/2006/main" xmlns:r="http://schemas.openxmlformats.org/officeDocument/2006/relationships" xmlns:p="http://schemas.openxmlformats.org/presentationml/2006/main">
+  <p:cSld>
+    <p:spTree>
+      <p:nvGrpSpPr>
+        <p:cNvPr id="1" name=""/>
+        <p:cNvGrpSpPr/>
+        <p:nvPr/>
+      </p:nvGrpSpPr>
+      <p:grpSpPr>
+        <a:xfrm>
+          <a:off x="0" y="0"/>
+          <a:ext cx="0" cy="0"/>
+          <a:chOff x="0" y="0"/>
+          <a:chExt cx="0" cy="0"/>
+        </a:xfrm>
+      </p:grpSpPr>
+      <p:sp>
+        <p:nvSpPr>
+          <p:cNvPr id="2" name="Título 1">
+            <a:extLst>
+              <a:ext uri="{FF2B5EF4-FFF2-40B4-BE49-F238E27FC236}">
+                <a16:creationId xmlns:a16="http://schemas.microsoft.com/office/drawing/2014/main" id="{0D6C6DDA-732C-40CD-8D46-65D2ECA5E0C7}"/>
+              </a:ext>
+            </a:extLst>
+          </p:cNvPr>
+          <p:cNvSpPr>
+            <a:spLocks noGrp="1"/>
+          </p:cNvSpPr>
+          <p:nvPr>
+            <p:ph type="title"/>
+          </p:nvPr>
+        </p:nvSpPr>
+        <p:spPr>
+          <a:xfrm>
+            <a:off x="585601" y="31873"/>
+            <a:ext cx="8534400" cy="1507067"/>
+          </a:xfrm>
+        </p:spPr>
+        <p:txBody>
+          <a:bodyPr/>
+          <a:lstStyle/>
+          <a:p>
+            <a:r>
+              <a:rPr lang="es-ES" dirty="0"/>
+              <a:t>Como crear una función?</a:t>
+            </a:r>
+          </a:p>
+        </p:txBody>
+      </p:sp>
+      <p:sp>
+        <p:nvSpPr>
+          <p:cNvPr id="3" name="Marcador de contenido 2">
+            <a:extLst>
+              <a:ext uri="{FF2B5EF4-FFF2-40B4-BE49-F238E27FC236}">
+                <a16:creationId xmlns:a16="http://schemas.microsoft.com/office/drawing/2014/main" id="{9F78E88E-E5EE-4B7C-9BE7-2144B9865A62}"/>
+              </a:ext>
+            </a:extLst>
+          </p:cNvPr>
+          <p:cNvSpPr>
+            <a:spLocks noGrp="1"/>
+          </p:cNvSpPr>
+          <p:nvPr>
+            <p:ph idx="1"/>
+          </p:nvPr>
+        </p:nvSpPr>
+        <p:spPr>
+          <a:xfrm>
+            <a:off x="3732212" y="1881714"/>
+            <a:ext cx="8534400" cy="3615267"/>
+          </a:xfrm>
+        </p:spPr>
+        <p:txBody>
+          <a:bodyPr/>
+          <a:lstStyle/>
+          <a:p>
+            <a:r>
+              <a:rPr lang="es-ES" dirty="0"/>
+              <a:t>Lo mismo que el anterior pero con la resta</a:t>
+            </a:r>
+          </a:p>
+        </p:txBody>
+      </p:sp>
+      <p:pic>
+        <p:nvPicPr>
+          <p:cNvPr id="6" name="Imagen 5">
+            <a:extLst>
+              <a:ext uri="{FF2B5EF4-FFF2-40B4-BE49-F238E27FC236}">
+                <a16:creationId xmlns:a16="http://schemas.microsoft.com/office/drawing/2014/main" id="{5552B9C9-4284-42C3-889D-DDCF92630037}"/>
+              </a:ext>
+            </a:extLst>
+          </p:cNvPr>
+          <p:cNvPicPr>
+            <a:picLocks noChangeAspect="1"/>
+          </p:cNvPicPr>
+          <p:nvPr/>
+        </p:nvPicPr>
+        <p:blipFill rotWithShape="1">
+          <a:blip r:embed="rId2"/>
+          <a:srcRect t="24475" b="56133"/>
+          <a:stretch/>
+        </p:blipFill>
+        <p:spPr>
+          <a:xfrm>
+            <a:off x="542732" y="3075514"/>
+            <a:ext cx="2676899" cy="485844"/>
+          </a:xfrm>
+          <a:prstGeom prst="rect">
+            <a:avLst/>
+          </a:prstGeom>
+        </p:spPr>
+      </p:pic>
+      <p:pic>
+        <p:nvPicPr>
+          <p:cNvPr id="7" name="Marcador de contenido 5">
+            <a:extLst>
+              <a:ext uri="{FF2B5EF4-FFF2-40B4-BE49-F238E27FC236}">
+                <a16:creationId xmlns:a16="http://schemas.microsoft.com/office/drawing/2014/main" id="{D8812460-8111-4F67-BFFD-74CEAECDF6E8}"/>
+              </a:ext>
+            </a:extLst>
+          </p:cNvPr>
+          <p:cNvPicPr>
+            <a:picLocks noChangeAspect="1"/>
+          </p:cNvPicPr>
+          <p:nvPr/>
+        </p:nvPicPr>
+        <p:blipFill>
+          <a:blip r:embed="rId3"/>
+          <a:stretch>
+            <a:fillRect/>
+          </a:stretch>
+        </p:blipFill>
+        <p:spPr>
+          <a:xfrm>
+            <a:off x="542732" y="3689348"/>
+            <a:ext cx="1295581" cy="485843"/>
+          </a:xfrm>
+          <a:prstGeom prst="rect">
+            <a:avLst/>
+          </a:prstGeom>
+        </p:spPr>
+      </p:pic>
+    </p:spTree>
+    <p:extLst>
+      <p:ext uri="{BB962C8B-B14F-4D97-AF65-F5344CB8AC3E}">
+        <p14:creationId xmlns:p14="http://schemas.microsoft.com/office/powerpoint/2010/main" val="1565638753"/>
+      </p:ext>
+    </p:extLst>
+  </p:cSld>
+  <p:clrMapOvr>
+    <a:masterClrMapping/>
+  </p:clrMapOvr>
+</p:sld>
+</file>
+
+<file path=ppt/slides/slide13.xml><?xml version="1.0" encoding="utf-8"?>
+<p:sld xmlns:a="http://schemas.openxmlformats.org/drawingml/2006/main" xmlns:r="http://schemas.openxmlformats.org/officeDocument/2006/relationships" xmlns:p="http://schemas.openxmlformats.org/presentationml/2006/main">
+  <p:cSld>
+    <p:spTree>
+      <p:nvGrpSpPr>
+        <p:cNvPr id="1" name=""/>
+        <p:cNvGrpSpPr/>
+        <p:nvPr/>
+      </p:nvGrpSpPr>
+      <p:grpSpPr>
+        <a:xfrm>
+          <a:off x="0" y="0"/>
+          <a:ext cx="0" cy="0"/>
+          <a:chOff x="0" y="0"/>
+          <a:chExt cx="0" cy="0"/>
+        </a:xfrm>
+      </p:grpSpPr>
+      <p:sp>
+        <p:nvSpPr>
+          <p:cNvPr id="2" name="Título 1">
+            <a:extLst>
+              <a:ext uri="{FF2B5EF4-FFF2-40B4-BE49-F238E27FC236}">
+                <a16:creationId xmlns:a16="http://schemas.microsoft.com/office/drawing/2014/main" id="{0D6C6DDA-732C-40CD-8D46-65D2ECA5E0C7}"/>
+              </a:ext>
+            </a:extLst>
+          </p:cNvPr>
+          <p:cNvSpPr>
+            <a:spLocks noGrp="1"/>
+          </p:cNvSpPr>
+          <p:nvPr>
+            <p:ph type="title"/>
+          </p:nvPr>
+        </p:nvSpPr>
+        <p:spPr>
+          <a:xfrm>
+            <a:off x="585601" y="31873"/>
+            <a:ext cx="8534400" cy="1507067"/>
+          </a:xfrm>
+        </p:spPr>
+        <p:txBody>
+          <a:bodyPr/>
+          <a:lstStyle/>
+          <a:p>
+            <a:r>
+              <a:rPr lang="es-ES" dirty="0"/>
+              <a:t>Como crear una función?</a:t>
+            </a:r>
+          </a:p>
+        </p:txBody>
+      </p:sp>
+      <p:sp>
+        <p:nvSpPr>
+          <p:cNvPr id="3" name="Marcador de contenido 2">
+            <a:extLst>
+              <a:ext uri="{FF2B5EF4-FFF2-40B4-BE49-F238E27FC236}">
+                <a16:creationId xmlns:a16="http://schemas.microsoft.com/office/drawing/2014/main" id="{9F78E88E-E5EE-4B7C-9BE7-2144B9865A62}"/>
+              </a:ext>
+            </a:extLst>
+          </p:cNvPr>
+          <p:cNvSpPr>
+            <a:spLocks noGrp="1"/>
+          </p:cNvSpPr>
+          <p:nvPr>
+            <p:ph idx="1"/>
+          </p:nvPr>
+        </p:nvSpPr>
+        <p:spPr>
+          <a:xfrm>
+            <a:off x="3657600" y="1327940"/>
+            <a:ext cx="8534400" cy="3615267"/>
+          </a:xfrm>
+        </p:spPr>
+        <p:txBody>
+          <a:bodyPr/>
+          <a:lstStyle/>
+          <a:p>
+            <a:r>
+              <a:rPr lang="es-ES" dirty="0"/>
+              <a:t>La función </a:t>
+            </a:r>
+            <a:r>
+              <a:rPr lang="es-ES" b="1" dirty="0"/>
+              <a:t>suman</a:t>
+            </a:r>
+            <a:r>
+              <a:rPr lang="es-ES" dirty="0"/>
+              <a:t> tiene como propósito calcular la suma de los números enteros desde 1 hasta el valor de n(inclusive)</a:t>
+            </a:r>
+          </a:p>
+        </p:txBody>
+      </p:sp>
+      <p:pic>
+        <p:nvPicPr>
+          <p:cNvPr id="5" name="Imagen 4">
+            <a:extLst>
+              <a:ext uri="{FF2B5EF4-FFF2-40B4-BE49-F238E27FC236}">
+                <a16:creationId xmlns:a16="http://schemas.microsoft.com/office/drawing/2014/main" id="{5D0FF954-00EF-44F2-B547-D2C960202BC9}"/>
+              </a:ext>
+            </a:extLst>
+          </p:cNvPr>
+          <p:cNvPicPr>
+            <a:picLocks noChangeAspect="1"/>
+          </p:cNvPicPr>
+          <p:nvPr/>
+        </p:nvPicPr>
+        <p:blipFill rotWithShape="1">
+          <a:blip r:embed="rId2"/>
+          <a:srcRect t="43415"/>
+          <a:stretch/>
+        </p:blipFill>
+        <p:spPr>
+          <a:xfrm>
+            <a:off x="585601" y="2528047"/>
+            <a:ext cx="2676899" cy="1417706"/>
+          </a:xfrm>
+          <a:prstGeom prst="rect">
+            <a:avLst/>
+          </a:prstGeom>
+        </p:spPr>
+      </p:pic>
+      <p:pic>
+        <p:nvPicPr>
+          <p:cNvPr id="6" name="Imagen 5">
+            <a:extLst>
+              <a:ext uri="{FF2B5EF4-FFF2-40B4-BE49-F238E27FC236}">
+                <a16:creationId xmlns:a16="http://schemas.microsoft.com/office/drawing/2014/main" id="{46DC6EB9-1362-47DF-97AD-BFFD2CFF5CFA}"/>
+              </a:ext>
+            </a:extLst>
+          </p:cNvPr>
+          <p:cNvPicPr>
+            <a:picLocks noChangeAspect="1"/>
+          </p:cNvPicPr>
+          <p:nvPr/>
+        </p:nvPicPr>
+        <p:blipFill>
+          <a:blip r:embed="rId3"/>
+          <a:stretch>
+            <a:fillRect/>
+          </a:stretch>
+        </p:blipFill>
+        <p:spPr>
+          <a:xfrm>
+            <a:off x="585601" y="4238233"/>
+            <a:ext cx="1991003" cy="1590897"/>
+          </a:xfrm>
+          <a:prstGeom prst="rect">
+            <a:avLst/>
+          </a:prstGeom>
+        </p:spPr>
+      </p:pic>
+    </p:spTree>
+    <p:extLst>
+      <p:ext uri="{BB962C8B-B14F-4D97-AF65-F5344CB8AC3E}">
+        <p14:creationId xmlns:p14="http://schemas.microsoft.com/office/powerpoint/2010/main" val="2167961978"/>
+      </p:ext>
+    </p:extLst>
+  </p:cSld>
+  <p:clrMapOvr>
+    <a:masterClrMapping/>
+  </p:clrMapOvr>
+</p:sld>
+</file>
+
+<file path=ppt/slides/slide14.xml><?xml version="1.0" encoding="utf-8"?>
+<p:sld xmlns:a="http://schemas.openxmlformats.org/drawingml/2006/main" xmlns:r="http://schemas.openxmlformats.org/officeDocument/2006/relationships" xmlns:p="http://schemas.openxmlformats.org/presentationml/2006/main">
+  <p:cSld>
+    <p:spTree>
+      <p:nvGrpSpPr>
+        <p:cNvPr id="1" name=""/>
+        <p:cNvGrpSpPr/>
+        <p:nvPr/>
+      </p:nvGrpSpPr>
+      <p:grpSpPr>
+        <a:xfrm>
+          <a:off x="0" y="0"/>
+          <a:ext cx="0" cy="0"/>
+          <a:chOff x="0" y="0"/>
+          <a:chExt cx="0" cy="0"/>
+        </a:xfrm>
+      </p:grpSpPr>
+      <p:sp>
+        <p:nvSpPr>
+          <p:cNvPr id="2" name="Título 1">
+            <a:extLst>
+              <a:ext uri="{FF2B5EF4-FFF2-40B4-BE49-F238E27FC236}">
+                <a16:creationId xmlns:a16="http://schemas.microsoft.com/office/drawing/2014/main" id="{7A58AA41-12DC-4819-BAC9-03EC849A3C88}"/>
+              </a:ext>
+            </a:extLst>
+          </p:cNvPr>
+          <p:cNvSpPr>
+            <a:spLocks noGrp="1"/>
+          </p:cNvSpPr>
+          <p:nvPr>
+            <p:ph type="title"/>
+          </p:nvPr>
+        </p:nvSpPr>
+        <p:spPr>
+          <a:xfrm>
+            <a:off x="684212" y="255990"/>
+            <a:ext cx="8534400" cy="1507067"/>
+          </a:xfrm>
+        </p:spPr>
+        <p:txBody>
+          <a:bodyPr/>
+          <a:lstStyle/>
+          <a:p>
+            <a:r>
+              <a:rPr lang="es-ES" dirty="0"/>
+              <a:t>Función apply</a:t>
+            </a:r>
+          </a:p>
+        </p:txBody>
+      </p:sp>
+      <p:sp>
+        <p:nvSpPr>
+          <p:cNvPr id="3" name="Marcador de contenido 2">
+            <a:extLst>
+              <a:ext uri="{FF2B5EF4-FFF2-40B4-BE49-F238E27FC236}">
+                <a16:creationId xmlns:a16="http://schemas.microsoft.com/office/drawing/2014/main" id="{CF47F371-EAF4-4F3B-A648-5377FEC8D4F0}"/>
+              </a:ext>
+            </a:extLst>
+          </p:cNvPr>
+          <p:cNvSpPr>
+            <a:spLocks noGrp="1"/>
+          </p:cNvSpPr>
+          <p:nvPr>
+            <p:ph idx="1"/>
+          </p:nvPr>
+        </p:nvSpPr>
+        <p:spPr>
+          <a:xfrm>
+            <a:off x="3197225" y="4058846"/>
+            <a:ext cx="8396755" cy="2104719"/>
+          </a:xfrm>
+        </p:spPr>
+        <p:txBody>
+          <a:bodyPr>
+            <a:normAutofit lnSpcReduction="10000"/>
+          </a:bodyPr>
+          <a:lstStyle/>
+          <a:p>
+            <a:r>
+              <a:rPr lang="es-ES" dirty="0"/>
+              <a:t>Creamos una matriz.</a:t>
+            </a:r>
+          </a:p>
+          <a:p>
+            <a:r>
+              <a:rPr lang="es-ES" dirty="0"/>
+              <a:t>Con la primera función </a:t>
+            </a:r>
+            <a:r>
+              <a:rPr lang="es-ES" b="1" dirty="0"/>
+              <a:t>apply</a:t>
+            </a:r>
+            <a:r>
+              <a:rPr lang="es-ES" dirty="0"/>
+              <a:t> se nos suman las filas 1+4+7 =12</a:t>
+            </a:r>
+          </a:p>
+          <a:p>
+            <a:r>
+              <a:rPr lang="es-ES" dirty="0"/>
+              <a:t>Con la siguiente función nos suma las columnas 1+2+3 = 6</a:t>
+            </a:r>
+          </a:p>
+          <a:p>
+            <a:r>
+              <a:rPr lang="es-ES" dirty="0"/>
+              <a:t>La clase es </a:t>
+            </a:r>
+            <a:r>
+              <a:rPr lang="es-ES" b="1" dirty="0"/>
+              <a:t>integra</a:t>
+            </a:r>
+            <a:r>
+              <a:rPr lang="es-ES" dirty="0"/>
+              <a:t> es decir sus números son enteros</a:t>
+            </a:r>
+          </a:p>
+          <a:p>
+            <a:r>
+              <a:rPr lang="es-ES" dirty="0"/>
+              <a:t>Lo ultimo es una función vectorizada</a:t>
+            </a:r>
+          </a:p>
+        </p:txBody>
+      </p:sp>
+      <p:pic>
+        <p:nvPicPr>
+          <p:cNvPr id="5" name="Imagen 4">
+            <a:extLst>
+              <a:ext uri="{FF2B5EF4-FFF2-40B4-BE49-F238E27FC236}">
+                <a16:creationId xmlns:a16="http://schemas.microsoft.com/office/drawing/2014/main" id="{576F82F5-19C9-4513-91A7-CB7823AD7A7F}"/>
+              </a:ext>
+            </a:extLst>
+          </p:cNvPr>
+          <p:cNvPicPr>
+            <a:picLocks noChangeAspect="1"/>
+          </p:cNvPicPr>
+          <p:nvPr/>
+        </p:nvPicPr>
+        <p:blipFill>
+          <a:blip r:embed="rId2"/>
+          <a:stretch>
+            <a:fillRect/>
+          </a:stretch>
+        </p:blipFill>
+        <p:spPr>
+          <a:xfrm>
+            <a:off x="390033" y="1821162"/>
+            <a:ext cx="2657846" cy="838317"/>
+          </a:xfrm>
+          <a:prstGeom prst="rect">
+            <a:avLst/>
+          </a:prstGeom>
+        </p:spPr>
+      </p:pic>
+      <p:pic>
+        <p:nvPicPr>
+          <p:cNvPr id="7" name="Imagen 6">
+            <a:extLst>
+              <a:ext uri="{FF2B5EF4-FFF2-40B4-BE49-F238E27FC236}">
+                <a16:creationId xmlns:a16="http://schemas.microsoft.com/office/drawing/2014/main" id="{255EA04C-DAA5-42B2-AB58-22D247544A0A}"/>
+              </a:ext>
+            </a:extLst>
+          </p:cNvPr>
+          <p:cNvPicPr>
+            <a:picLocks noChangeAspect="1"/>
+          </p:cNvPicPr>
+          <p:nvPr/>
+        </p:nvPicPr>
+        <p:blipFill>
+          <a:blip r:embed="rId3"/>
+          <a:stretch>
+            <a:fillRect/>
+          </a:stretch>
+        </p:blipFill>
+        <p:spPr>
+          <a:xfrm>
+            <a:off x="3197225" y="1853529"/>
+            <a:ext cx="5315692" cy="2114845"/>
+          </a:xfrm>
+          <a:prstGeom prst="rect">
+            <a:avLst/>
+          </a:prstGeom>
+        </p:spPr>
+      </p:pic>
+      <p:pic>
+        <p:nvPicPr>
+          <p:cNvPr id="9" name="Imagen 8">
+            <a:extLst>
+              <a:ext uri="{FF2B5EF4-FFF2-40B4-BE49-F238E27FC236}">
+                <a16:creationId xmlns:a16="http://schemas.microsoft.com/office/drawing/2014/main" id="{559E062C-C75B-467C-B041-36B25F2C2E6E}"/>
+              </a:ext>
+            </a:extLst>
+          </p:cNvPr>
+          <p:cNvPicPr>
+            <a:picLocks noChangeAspect="1"/>
+          </p:cNvPicPr>
+          <p:nvPr/>
+        </p:nvPicPr>
+        <p:blipFill rotWithShape="1">
+          <a:blip r:embed="rId4"/>
+          <a:srcRect r="6689"/>
+          <a:stretch/>
+        </p:blipFill>
+        <p:spPr>
+          <a:xfrm>
+            <a:off x="390034" y="2717584"/>
+            <a:ext cx="2657846" cy="2353003"/>
+          </a:xfrm>
+          <a:prstGeom prst="rect">
+            <a:avLst/>
+          </a:prstGeom>
+        </p:spPr>
+      </p:pic>
+    </p:spTree>
+    <p:extLst>
+      <p:ext uri="{BB962C8B-B14F-4D97-AF65-F5344CB8AC3E}">
+        <p14:creationId xmlns:p14="http://schemas.microsoft.com/office/powerpoint/2010/main" val="416521174"/>
+      </p:ext>
+    </p:extLst>
+  </p:cSld>
+  <p:clrMapOvr>
+    <a:masterClrMapping/>
+  </p:clrMapOvr>
+</p:sld>
+</file>
+
+<file path=ppt/slides/slide15.xml><?xml version="1.0" encoding="utf-8"?>
+<p:sld xmlns:a="http://schemas.openxmlformats.org/drawingml/2006/main" xmlns:r="http://schemas.openxmlformats.org/officeDocument/2006/relationships" xmlns:p="http://schemas.openxmlformats.org/presentationml/2006/main">
+  <p:cSld>
+    <p:spTree>
+      <p:nvGrpSpPr>
+        <p:cNvPr id="1" name=""/>
+        <p:cNvGrpSpPr/>
+        <p:nvPr/>
+      </p:nvGrpSpPr>
+      <p:grpSpPr>
+        <a:xfrm>
+          <a:off x="0" y="0"/>
+          <a:ext cx="0" cy="0"/>
+          <a:chOff x="0" y="0"/>
+          <a:chExt cx="0" cy="0"/>
+        </a:xfrm>
+      </p:grpSpPr>
+      <p:sp>
+        <p:nvSpPr>
+          <p:cNvPr id="2" name="Título 1">
+            <a:extLst>
+              <a:ext uri="{FF2B5EF4-FFF2-40B4-BE49-F238E27FC236}">
+                <a16:creationId xmlns:a16="http://schemas.microsoft.com/office/drawing/2014/main" id="{B9D7486E-3860-4E57-A97A-C6842B5E7418}"/>
+              </a:ext>
+            </a:extLst>
+          </p:cNvPr>
+          <p:cNvSpPr>
+            <a:spLocks noGrp="1"/>
+          </p:cNvSpPr>
+          <p:nvPr>
+            <p:ph type="title"/>
+          </p:nvPr>
+        </p:nvSpPr>
+        <p:spPr>
+          <a:xfrm>
+            <a:off x="540777" y="336674"/>
+            <a:ext cx="8534400" cy="1507067"/>
+          </a:xfrm>
+        </p:spPr>
+        <p:txBody>
+          <a:bodyPr/>
+          <a:lstStyle/>
+          <a:p>
+            <a:r>
+              <a:rPr lang="es-ES" dirty="0"/>
+              <a:t>Función apply y dataframes</a:t>
+            </a:r>
+          </a:p>
+        </p:txBody>
+      </p:sp>
+      <p:sp>
+        <p:nvSpPr>
+          <p:cNvPr id="3" name="Marcador de contenido 2">
+            <a:extLst>
+              <a:ext uri="{FF2B5EF4-FFF2-40B4-BE49-F238E27FC236}">
+                <a16:creationId xmlns:a16="http://schemas.microsoft.com/office/drawing/2014/main" id="{CA0E73C9-A1C1-4E7E-B0E2-7D6E0B5D8BE0}"/>
+              </a:ext>
+            </a:extLst>
+          </p:cNvPr>
+          <p:cNvSpPr>
+            <a:spLocks noGrp="1"/>
+          </p:cNvSpPr>
+          <p:nvPr>
+            <p:ph idx="1"/>
+          </p:nvPr>
+        </p:nvSpPr>
+        <p:spPr>
+          <a:xfrm>
+            <a:off x="4853638" y="1453639"/>
+            <a:ext cx="6873035" cy="3615267"/>
+          </a:xfrm>
+        </p:spPr>
+        <p:txBody>
+          <a:bodyPr/>
+          <a:lstStyle/>
+          <a:p>
+            <a:r>
+              <a:rPr lang="es-ES" dirty="0"/>
+              <a:t>Creamos un dataframe</a:t>
+            </a:r>
+          </a:p>
+          <a:p>
+            <a:r>
+              <a:rPr lang="es-ES" dirty="0"/>
+              <a:t>Como ves apply nos suma las columnas y las filas del dataframe </a:t>
+            </a:r>
+          </a:p>
+        </p:txBody>
+      </p:sp>
+      <p:pic>
+        <p:nvPicPr>
+          <p:cNvPr id="5" name="Imagen 4">
+            <a:extLst>
+              <a:ext uri="{FF2B5EF4-FFF2-40B4-BE49-F238E27FC236}">
+                <a16:creationId xmlns:a16="http://schemas.microsoft.com/office/drawing/2014/main" id="{7532E9AA-9E47-4D5B-BF33-D64552FB9F16}"/>
+              </a:ext>
+            </a:extLst>
+          </p:cNvPr>
+          <p:cNvPicPr>
+            <a:picLocks noChangeAspect="1"/>
+          </p:cNvPicPr>
+          <p:nvPr/>
+        </p:nvPicPr>
+        <p:blipFill>
+          <a:blip r:embed="rId2"/>
+          <a:stretch>
+            <a:fillRect/>
+          </a:stretch>
+        </p:blipFill>
+        <p:spPr>
+          <a:xfrm>
+            <a:off x="465327" y="2108587"/>
+            <a:ext cx="3982006" cy="1152686"/>
+          </a:xfrm>
+          <a:prstGeom prst="rect">
+            <a:avLst/>
+          </a:prstGeom>
+        </p:spPr>
+      </p:pic>
+      <p:pic>
+        <p:nvPicPr>
+          <p:cNvPr id="7" name="Imagen 6">
+            <a:extLst>
+              <a:ext uri="{FF2B5EF4-FFF2-40B4-BE49-F238E27FC236}">
+                <a16:creationId xmlns:a16="http://schemas.microsoft.com/office/drawing/2014/main" id="{6EDBC734-C127-4A95-96B7-A51CD1AF5D36}"/>
+              </a:ext>
+            </a:extLst>
+          </p:cNvPr>
+          <p:cNvPicPr>
+            <a:picLocks noChangeAspect="1"/>
+          </p:cNvPicPr>
+          <p:nvPr/>
+        </p:nvPicPr>
+        <p:blipFill>
+          <a:blip r:embed="rId3"/>
+          <a:stretch>
+            <a:fillRect/>
+          </a:stretch>
+        </p:blipFill>
+        <p:spPr>
+          <a:xfrm>
+            <a:off x="465327" y="3526119"/>
+            <a:ext cx="3629532" cy="1705213"/>
+          </a:xfrm>
+          <a:prstGeom prst="rect">
+            <a:avLst/>
+          </a:prstGeom>
+        </p:spPr>
+      </p:pic>
+    </p:spTree>
+    <p:extLst>
+      <p:ext uri="{BB962C8B-B14F-4D97-AF65-F5344CB8AC3E}">
+        <p14:creationId xmlns:p14="http://schemas.microsoft.com/office/powerpoint/2010/main" val="1955202782"/>
+      </p:ext>
+    </p:extLst>
+  </p:cSld>
+  <p:clrMapOvr>
+    <a:masterClrMapping/>
+  </p:clrMapOvr>
+</p:sld>
+</file>
+
+<file path=ppt/slides/slide16.xml><?xml version="1.0" encoding="utf-8"?>
+<p:sld xmlns:a="http://schemas.openxmlformats.org/drawingml/2006/main" xmlns:r="http://schemas.openxmlformats.org/officeDocument/2006/relationships" xmlns:p="http://schemas.openxmlformats.org/presentationml/2006/main">
+  <p:cSld>
+    <p:spTree>
+      <p:nvGrpSpPr>
+        <p:cNvPr id="1" name=""/>
+        <p:cNvGrpSpPr/>
+        <p:nvPr/>
+      </p:nvGrpSpPr>
+      <p:grpSpPr>
+        <a:xfrm>
+          <a:off x="0" y="0"/>
+          <a:ext cx="0" cy="0"/>
+          <a:chOff x="0" y="0"/>
+          <a:chExt cx="0" cy="0"/>
+        </a:xfrm>
+      </p:grpSpPr>
+      <p:sp>
+        <p:nvSpPr>
+          <p:cNvPr id="2" name="Título 1">
+            <a:extLst>
+              <a:ext uri="{FF2B5EF4-FFF2-40B4-BE49-F238E27FC236}">
+                <a16:creationId xmlns:a16="http://schemas.microsoft.com/office/drawing/2014/main" id="{49B6563F-2202-49AE-93BD-8B04B0E1C878}"/>
+              </a:ext>
+            </a:extLst>
+          </p:cNvPr>
+          <p:cNvSpPr>
+            <a:spLocks noGrp="1"/>
+          </p:cNvSpPr>
+          <p:nvPr>
+            <p:ph type="title"/>
+          </p:nvPr>
+        </p:nvSpPr>
+        <p:spPr>
+          <a:xfrm>
+            <a:off x="451130" y="354603"/>
+            <a:ext cx="8534400" cy="1507067"/>
+          </a:xfrm>
+        </p:spPr>
+        <p:txBody>
+          <a:bodyPr/>
+          <a:lstStyle/>
+          <a:p>
+            <a:r>
+              <a:rPr lang="es-ES" dirty="0"/>
+              <a:t>Función apply y datagramas</a:t>
+            </a:r>
+          </a:p>
+        </p:txBody>
+      </p:sp>
+      <p:sp>
+        <p:nvSpPr>
+          <p:cNvPr id="3" name="Marcador de contenido 2">
+            <a:extLst>
+              <a:ext uri="{FF2B5EF4-FFF2-40B4-BE49-F238E27FC236}">
+                <a16:creationId xmlns:a16="http://schemas.microsoft.com/office/drawing/2014/main" id="{8BDA65D6-61A9-458F-B451-399AA5610571}"/>
+              </a:ext>
+            </a:extLst>
+          </p:cNvPr>
+          <p:cNvSpPr>
+            <a:spLocks noGrp="1"/>
+          </p:cNvSpPr>
+          <p:nvPr>
+            <p:ph idx="1"/>
+          </p:nvPr>
+        </p:nvSpPr>
+        <p:spPr>
+          <a:xfrm>
+            <a:off x="4305953" y="1958788"/>
+            <a:ext cx="5600047" cy="3615267"/>
+          </a:xfrm>
+        </p:spPr>
+        <p:txBody>
+          <a:bodyPr/>
+          <a:lstStyle/>
+          <a:p>
+            <a:r>
+              <a:rPr lang="es-ES" dirty="0"/>
+              <a:t>Guardamos en una matriz los elementos con </a:t>
+            </a:r>
+            <a:r>
+              <a:rPr lang="es-ES" b="1" dirty="0"/>
+              <a:t>M &lt;- as.matrix(df)</a:t>
+            </a:r>
+          </a:p>
+          <a:p>
+            <a:r>
+              <a:rPr lang="es-ES" dirty="0"/>
+              <a:t>Al pedir </a:t>
+            </a:r>
+            <a:r>
+              <a:rPr lang="es-ES" b="1" dirty="0"/>
+              <a:t>M</a:t>
+            </a:r>
+            <a:r>
+              <a:rPr lang="es-ES" dirty="0"/>
+              <a:t> como veis nos devuelve la información</a:t>
+            </a:r>
+          </a:p>
+        </p:txBody>
+      </p:sp>
+      <p:pic>
+        <p:nvPicPr>
+          <p:cNvPr id="5" name="Imagen 4">
+            <a:extLst>
+              <a:ext uri="{FF2B5EF4-FFF2-40B4-BE49-F238E27FC236}">
+                <a16:creationId xmlns:a16="http://schemas.microsoft.com/office/drawing/2014/main" id="{AEAE25D7-D6C6-40B2-B886-AD3844AD00D1}"/>
+              </a:ext>
+            </a:extLst>
+          </p:cNvPr>
+          <p:cNvPicPr>
+            <a:picLocks noChangeAspect="1"/>
+          </p:cNvPicPr>
+          <p:nvPr/>
+        </p:nvPicPr>
+        <p:blipFill>
+          <a:blip r:embed="rId2"/>
+          <a:stretch>
+            <a:fillRect/>
+          </a:stretch>
+        </p:blipFill>
+        <p:spPr>
+          <a:xfrm>
+            <a:off x="572178" y="2596776"/>
+            <a:ext cx="2333951" cy="1971950"/>
+          </a:xfrm>
+          <a:prstGeom prst="rect">
+            <a:avLst/>
+          </a:prstGeom>
+        </p:spPr>
+      </p:pic>
+    </p:spTree>
+    <p:extLst>
+      <p:ext uri="{BB962C8B-B14F-4D97-AF65-F5344CB8AC3E}">
+        <p14:creationId xmlns:p14="http://schemas.microsoft.com/office/powerpoint/2010/main" val="968512078"/>
+      </p:ext>
+    </p:extLst>
+  </p:cSld>
+  <p:clrMapOvr>
+    <a:masterClrMapping/>
+  </p:clrMapOvr>
+</p:sld>
+</file>
+
+<file path=ppt/slides/slide17.xml><?xml version="1.0" encoding="utf-8"?>
+<p:sld xmlns:a="http://schemas.openxmlformats.org/drawingml/2006/main" xmlns:r="http://schemas.openxmlformats.org/officeDocument/2006/relationships" xmlns:p="http://schemas.openxmlformats.org/presentationml/2006/main">
+  <p:cSld>
+    <p:spTree>
+      <p:nvGrpSpPr>
+        <p:cNvPr id="1" name=""/>
+        <p:cNvGrpSpPr/>
+        <p:nvPr/>
+      </p:nvGrpSpPr>
+      <p:grpSpPr>
+        <a:xfrm>
+          <a:off x="0" y="0"/>
+          <a:ext cx="0" cy="0"/>
+          <a:chOff x="0" y="0"/>
+          <a:chExt cx="0" cy="0"/>
+        </a:xfrm>
+      </p:grpSpPr>
+      <p:sp>
+        <p:nvSpPr>
+          <p:cNvPr id="2" name="Título 1">
+            <a:extLst>
+              <a:ext uri="{FF2B5EF4-FFF2-40B4-BE49-F238E27FC236}">
+                <a16:creationId xmlns:a16="http://schemas.microsoft.com/office/drawing/2014/main" id="{86F30E4F-3DE5-45D9-8F55-0002FE3E84E8}"/>
+              </a:ext>
+            </a:extLst>
+          </p:cNvPr>
+          <p:cNvSpPr>
+            <a:spLocks noGrp="1"/>
+          </p:cNvSpPr>
+          <p:nvPr>
+            <p:ph type="title"/>
+          </p:nvPr>
+        </p:nvSpPr>
+        <p:spPr>
+          <a:xfrm>
+            <a:off x="684212" y="148414"/>
+            <a:ext cx="8534400" cy="1507067"/>
+          </a:xfrm>
+        </p:spPr>
+        <p:txBody>
+          <a:bodyPr/>
+          <a:lstStyle/>
+          <a:p>
+            <a:r>
+              <a:rPr lang="es-ES" dirty="0"/>
+              <a:t>Listas y función lapply</a:t>
+            </a:r>
+          </a:p>
+        </p:txBody>
+      </p:sp>
+      <p:sp>
+        <p:nvSpPr>
+          <p:cNvPr id="3" name="Marcador de contenido 2">
+            <a:extLst>
+              <a:ext uri="{FF2B5EF4-FFF2-40B4-BE49-F238E27FC236}">
+                <a16:creationId xmlns:a16="http://schemas.microsoft.com/office/drawing/2014/main" id="{AE7CFA81-3CEB-4FC0-8B13-8438F95B65E7}"/>
+              </a:ext>
+            </a:extLst>
+          </p:cNvPr>
+          <p:cNvSpPr>
+            <a:spLocks noGrp="1"/>
+          </p:cNvSpPr>
+          <p:nvPr>
+            <p:ph idx="1"/>
+          </p:nvPr>
+        </p:nvSpPr>
+        <p:spPr>
+          <a:xfrm>
+            <a:off x="6517341" y="1070663"/>
+            <a:ext cx="5100918" cy="3615267"/>
+          </a:xfrm>
+        </p:spPr>
+        <p:txBody>
+          <a:bodyPr/>
+          <a:lstStyle/>
+          <a:p>
+            <a:r>
+              <a:rPr lang="es-ES" dirty="0"/>
+              <a:t>Creamos las listas y con la función </a:t>
+            </a:r>
+            <a:r>
+              <a:rPr lang="es-ES" b="1" dirty="0"/>
+              <a:t>lapply</a:t>
+            </a:r>
+            <a:r>
+              <a:rPr lang="es-ES" dirty="0"/>
+              <a:t> nos calcula la media de química y de matemáticas</a:t>
+            </a:r>
+          </a:p>
+        </p:txBody>
+      </p:sp>
+      <p:pic>
+        <p:nvPicPr>
+          <p:cNvPr id="5" name="Imagen 4">
+            <a:extLst>
+              <a:ext uri="{FF2B5EF4-FFF2-40B4-BE49-F238E27FC236}">
+                <a16:creationId xmlns:a16="http://schemas.microsoft.com/office/drawing/2014/main" id="{581072AA-8650-4749-B24F-974A8DCC553F}"/>
+              </a:ext>
+            </a:extLst>
+          </p:cNvPr>
+          <p:cNvPicPr>
+            <a:picLocks noChangeAspect="1"/>
+          </p:cNvPicPr>
+          <p:nvPr/>
+        </p:nvPicPr>
+        <p:blipFill>
+          <a:blip r:embed="rId2"/>
+          <a:stretch>
+            <a:fillRect/>
+          </a:stretch>
+        </p:blipFill>
+        <p:spPr>
+          <a:xfrm>
+            <a:off x="445044" y="2144770"/>
+            <a:ext cx="5582429" cy="733527"/>
+          </a:xfrm>
+          <a:prstGeom prst="rect">
+            <a:avLst/>
+          </a:prstGeom>
+        </p:spPr>
+      </p:pic>
+      <p:pic>
+        <p:nvPicPr>
+          <p:cNvPr id="7" name="Imagen 6">
+            <a:extLst>
+              <a:ext uri="{FF2B5EF4-FFF2-40B4-BE49-F238E27FC236}">
+                <a16:creationId xmlns:a16="http://schemas.microsoft.com/office/drawing/2014/main" id="{A5BEE1B0-A8B7-45CD-9EF6-1310CFBD9F71}"/>
+              </a:ext>
+            </a:extLst>
+          </p:cNvPr>
+          <p:cNvPicPr>
+            <a:picLocks noChangeAspect="1"/>
+          </p:cNvPicPr>
+          <p:nvPr/>
+        </p:nvPicPr>
+        <p:blipFill>
+          <a:blip r:embed="rId3"/>
+          <a:stretch>
+            <a:fillRect/>
+          </a:stretch>
+        </p:blipFill>
+        <p:spPr>
+          <a:xfrm>
+            <a:off x="445044" y="3118068"/>
+            <a:ext cx="5896798" cy="1314633"/>
+          </a:xfrm>
+          <a:prstGeom prst="rect">
+            <a:avLst/>
+          </a:prstGeom>
+        </p:spPr>
+      </p:pic>
+    </p:spTree>
+    <p:extLst>
+      <p:ext uri="{BB962C8B-B14F-4D97-AF65-F5344CB8AC3E}">
+        <p14:creationId xmlns:p14="http://schemas.microsoft.com/office/powerpoint/2010/main" val="1978362392"/>
+      </p:ext>
+    </p:extLst>
+  </p:cSld>
+  <p:clrMapOvr>
+    <a:masterClrMapping/>
+  </p:clrMapOvr>
+</p:sld>
+</file>
+
 <file path=ppt/slides/slide2.xml><?xml version="1.0" encoding="utf-8"?>
 <p:sld xmlns:a="http://schemas.openxmlformats.org/drawingml/2006/main" xmlns:r="http://schemas.openxmlformats.org/officeDocument/2006/relationships" xmlns:p="http://schemas.openxmlformats.org/presentationml/2006/main">
   <p:cSld>
@@ -5531,13 +6708,8 @@
           <a:p>
             <a:r>
               <a:rPr lang="es-ES" dirty="0"/>
-              <a:t>ciclo </a:t>
-            </a:r>
-            <a:r>
-              <a:rPr lang="es-ES" dirty="0" err="1"/>
-              <a:t>for</a:t>
-            </a:r>
-            <a:endParaRPr lang="es-ES" dirty="0"/>
+              <a:t>ciclo for</a:t>
+            </a:r>
           </a:p>
         </p:txBody>
       </p:sp>
@@ -5581,23 +6753,7 @@
                   <a:schemeClr val="bg1"/>
                 </a:solidFill>
               </a:rPr>
-              <a:t>“</a:t>
-            </a:r>
-            <a:r>
-              <a:rPr lang="es-ES" b="1" dirty="0" err="1">
-                <a:solidFill>
-                  <a:schemeClr val="bg1"/>
-                </a:solidFill>
-              </a:rPr>
-              <a:t>for</a:t>
-            </a:r>
-            <a:r>
-              <a:rPr lang="es-ES" b="1" dirty="0">
-                <a:solidFill>
-                  <a:schemeClr val="bg1"/>
-                </a:solidFill>
-              </a:rPr>
-              <a:t> (i in 1:5)”</a:t>
+              <a:t>“for (i in 1:5)”</a:t>
             </a:r>
             <a:r>
               <a:rPr lang="es-ES" dirty="0">
@@ -5673,15 +6829,15 @@
                   <a:schemeClr val="bg1"/>
                 </a:solidFill>
               </a:rPr>
-              <a:t>“</a:t>
-            </a:r>
-            <a:r>
-              <a:rPr lang="es-ES" b="1" dirty="0" err="1">
+              <a:t>“s+edades[i]” </a:t>
+            </a:r>
+            <a:r>
+              <a:rPr lang="es-ES" dirty="0">
                 <a:solidFill>
                   <a:schemeClr val="bg1"/>
                 </a:solidFill>
               </a:rPr>
-              <a:t>s+edades</a:t>
+              <a:t>de resultado obtenemos </a:t>
             </a:r>
             <a:r>
               <a:rPr lang="es-ES" b="1" dirty="0">
@@ -5689,7 +6845,7 @@
                   <a:schemeClr val="bg1"/>
                 </a:solidFill>
               </a:rPr>
-              <a:t>[i]”</a:t>
+              <a:t>101</a:t>
             </a:r>
           </a:p>
           <a:p>
@@ -5748,7 +6904,7 @@
         </p:blipFill>
         <p:spPr>
           <a:xfrm>
-            <a:off x="179295" y="3652368"/>
+            <a:off x="276030" y="3652368"/>
             <a:ext cx="3134162" cy="2501154"/>
           </a:xfrm>
           <a:prstGeom prst="rect">
@@ -5778,7 +6934,7 @@
         </p:blipFill>
         <p:spPr>
           <a:xfrm>
-            <a:off x="2468730" y="1258298"/>
+            <a:off x="2820112" y="1258298"/>
             <a:ext cx="5258534" cy="1381318"/>
           </a:xfrm>
           <a:prstGeom prst="rect">
@@ -5845,18 +7001,9 @@
           <a:lstStyle/>
           <a:p>
             <a:r>
-              <a:rPr lang="es-ES" dirty="0" err="1"/>
-              <a:t>If</a:t>
-            </a:r>
-            <a:r>
               <a:rPr lang="es-ES" dirty="0"/>
-              <a:t> </a:t>
-            </a:r>
-            <a:r>
-              <a:rPr lang="es-ES" dirty="0" err="1"/>
-              <a:t>else</a:t>
-            </a:r>
-            <a:endParaRPr lang="es-ES" dirty="0"/>
+              <a:t>If else</a:t>
+            </a:r>
           </a:p>
         </p:txBody>
       </p:sp>
@@ -5878,7 +7025,7 @@
         </p:nvSpPr>
         <p:spPr>
           <a:xfrm>
-            <a:off x="4790046" y="2105493"/>
+            <a:off x="5623764" y="2442919"/>
             <a:ext cx="6400800" cy="1947333"/>
           </a:xfrm>
         </p:spPr>
@@ -5890,15 +7037,7 @@
           <a:p>
             <a:r>
               <a:rPr lang="es-ES" dirty="0"/>
-              <a:t>Como </a:t>
-            </a:r>
-            <a:r>
-              <a:rPr lang="es-ES" dirty="0" err="1"/>
-              <a:t>podeis</a:t>
-            </a:r>
-            <a:r>
-              <a:rPr lang="es-ES" dirty="0"/>
-              <a:t> observar aplicando </a:t>
+              <a:t>Como podéis observar aplicando </a:t>
             </a:r>
             <a:r>
               <a:rPr lang="es-ES" dirty="0">
@@ -5906,23 +7045,7 @@
                   <a:schemeClr val="bg1"/>
                 </a:solidFill>
               </a:rPr>
-              <a:t>“</a:t>
-            </a:r>
-            <a:r>
-              <a:rPr lang="es-ES" dirty="0" err="1">
-                <a:solidFill>
-                  <a:schemeClr val="bg1"/>
-                </a:solidFill>
-              </a:rPr>
-              <a:t>if</a:t>
-            </a:r>
-            <a:r>
-              <a:rPr lang="es-ES" dirty="0">
-                <a:solidFill>
-                  <a:schemeClr val="bg1"/>
-                </a:solidFill>
-              </a:rPr>
-              <a:t> (N%%2 == 0)”</a:t>
+              <a:t>“if (N%%2 == 0)”</a:t>
             </a:r>
           </a:p>
           <a:p>
@@ -6015,7 +7138,7 @@
         </p:blipFill>
         <p:spPr>
           <a:xfrm>
-            <a:off x="2644389" y="1814182"/>
+            <a:off x="3257804" y="1821685"/>
             <a:ext cx="1752544" cy="1257475"/>
           </a:xfrm>
           <a:prstGeom prst="rect">
@@ -6044,7 +7167,7 @@
         </p:blipFill>
         <p:spPr>
           <a:xfrm>
-            <a:off x="2577404" y="3071657"/>
+            <a:off x="3257805" y="3079160"/>
             <a:ext cx="1819529" cy="1402606"/>
           </a:xfrm>
           <a:prstGeom prst="rect">
@@ -6110,15 +7233,7 @@
           <a:p>
             <a:r>
               <a:rPr lang="es-ES" dirty="0"/>
-              <a:t>IF </a:t>
-            </a:r>
-            <a:r>
-              <a:rPr lang="es-ES" dirty="0" err="1"/>
-              <a:t>Else</a:t>
-            </a:r>
-            <a:r>
-              <a:rPr lang="es-ES" dirty="0"/>
-              <a:t> PT 2</a:t>
+              <a:t>IF Else PT 2</a:t>
             </a:r>
           </a:p>
         </p:txBody>
@@ -6150,15 +7265,7 @@
             </a:r>
             <a:r>
               <a:rPr lang="es-ES" b="1" dirty="0"/>
-              <a:t>“</a:t>
-            </a:r>
-            <a:r>
-              <a:rPr lang="es-ES" b="1" dirty="0" err="1"/>
-              <a:t>ifelse</a:t>
-            </a:r>
-            <a:r>
-              <a:rPr lang="es-ES" b="1" dirty="0"/>
-              <a:t>” </a:t>
+              <a:t>“ifelse” </a:t>
             </a:r>
             <a:r>
               <a:rPr lang="es-ES" dirty="0"/>
@@ -6350,15 +7457,7 @@
           <a:p>
             <a:r>
               <a:rPr lang="es-ES" dirty="0"/>
-              <a:t>Con el ciclo </a:t>
-            </a:r>
-            <a:r>
-              <a:rPr lang="es-ES" dirty="0" err="1"/>
-              <a:t>while</a:t>
-            </a:r>
-            <a:r>
-              <a:rPr lang="es-ES" dirty="0"/>
-              <a:t> pudimos imprimir </a:t>
+              <a:t>Con el ciclo while pudimos imprimir </a:t>
             </a:r>
             <a:r>
               <a:rPr lang="es-ES" b="1" dirty="0"/>
@@ -6370,15 +7469,7 @@
             </a:r>
             <a:r>
               <a:rPr lang="es-ES" b="1" dirty="0"/>
-              <a:t>“</a:t>
-            </a:r>
-            <a:r>
-              <a:rPr lang="es-ES" b="1" dirty="0" err="1"/>
-              <a:t>while</a:t>
-            </a:r>
-            <a:r>
-              <a:rPr lang="es-ES" b="1" dirty="0"/>
-              <a:t>(k&lt;10)”</a:t>
+              <a:t>“while(k&lt;10)”</a:t>
             </a:r>
           </a:p>
           <a:p>
@@ -6505,26 +7596,9 @@
           <a:lstStyle/>
           <a:p>
             <a:r>
-              <a:rPr lang="es-ES" dirty="0" err="1"/>
-              <a:t>BREak</a:t>
-            </a:r>
-            <a:r>
               <a:rPr lang="es-ES" dirty="0"/>
-              <a:t> </a:t>
-            </a:r>
-            <a:r>
-              <a:rPr lang="es-ES" dirty="0" err="1"/>
-              <a:t>next</a:t>
-            </a:r>
-            <a:r>
-              <a:rPr lang="es-ES" dirty="0"/>
-              <a:t> </a:t>
-            </a:r>
-            <a:r>
-              <a:rPr lang="es-ES" dirty="0" err="1"/>
-              <a:t>repeat</a:t>
-            </a:r>
-            <a:endParaRPr lang="es-ES" dirty="0"/>
+              <a:t>BREak next repeat</a:t>
+            </a:r>
           </a:p>
         </p:txBody>
       </p:sp>
@@ -6560,15 +7634,7 @@
             </a:r>
             <a:r>
               <a:rPr lang="es-ES" b="1" dirty="0"/>
-              <a:t>“</a:t>
-            </a:r>
-            <a:r>
-              <a:rPr lang="es-ES" b="1" dirty="0" err="1"/>
-              <a:t>if</a:t>
-            </a:r>
-            <a:r>
-              <a:rPr lang="es-ES" b="1" dirty="0"/>
-              <a:t>(i=3){break}”</a:t>
+              <a:t>“if(i=3){break}”</a:t>
             </a:r>
           </a:p>
           <a:p>
@@ -6695,26 +7761,9 @@
           <a:lstStyle/>
           <a:p>
             <a:r>
-              <a:rPr lang="es-ES" dirty="0" err="1"/>
-              <a:t>BREak</a:t>
-            </a:r>
-            <a:r>
               <a:rPr lang="es-ES" dirty="0"/>
-              <a:t> </a:t>
-            </a:r>
-            <a:r>
-              <a:rPr lang="es-ES" dirty="0" err="1"/>
-              <a:t>next</a:t>
-            </a:r>
-            <a:r>
-              <a:rPr lang="es-ES" dirty="0"/>
-              <a:t> </a:t>
-            </a:r>
-            <a:r>
-              <a:rPr lang="es-ES" dirty="0" err="1"/>
-              <a:t>repeat</a:t>
-            </a:r>
-            <a:endParaRPr lang="es-ES" dirty="0"/>
+              <a:t>BREak next repeat</a:t>
+            </a:r>
           </a:p>
         </p:txBody>
       </p:sp>
@@ -6749,20 +7798,12 @@
               <a:t>Aplicando </a:t>
             </a:r>
             <a:r>
-              <a:rPr lang="es-ES" b="1" dirty="0" err="1"/>
+              <a:rPr lang="es-ES" b="1" dirty="0"/>
               <a:t>next</a:t>
             </a:r>
             <a:r>
               <a:rPr lang="es-ES" dirty="0"/>
-              <a:t> como </a:t>
-            </a:r>
-            <a:r>
-              <a:rPr lang="es-ES" dirty="0" err="1"/>
-              <a:t>podeis</a:t>
-            </a:r>
-            <a:r>
-              <a:rPr lang="es-ES" dirty="0"/>
-              <a:t> observar el bucle no muere pero el numero 3 se lo salta</a:t>
+              <a:t> como podéis observar el bucle no muere pero el numero 3 se lo salta</a:t>
             </a:r>
             <a:endParaRPr lang="es-ES" b="1" dirty="0"/>
           </a:p>
@@ -6888,26 +7929,9 @@
           <a:lstStyle/>
           <a:p>
             <a:r>
-              <a:rPr lang="es-ES" dirty="0" err="1"/>
-              <a:t>BREak</a:t>
-            </a:r>
-            <a:r>
               <a:rPr lang="es-ES" dirty="0"/>
-              <a:t> </a:t>
-            </a:r>
-            <a:r>
-              <a:rPr lang="es-ES" dirty="0" err="1"/>
-              <a:t>next</a:t>
-            </a:r>
-            <a:r>
-              <a:rPr lang="es-ES" dirty="0"/>
-              <a:t> </a:t>
-            </a:r>
-            <a:r>
-              <a:rPr lang="es-ES" dirty="0" err="1"/>
-              <a:t>repeat</a:t>
-            </a:r>
-            <a:endParaRPr lang="es-ES" dirty="0"/>
+              <a:t>BREak next repeat</a:t>
+            </a:r>
           </a:p>
         </p:txBody>
       </p:sp>
@@ -6950,7 +7974,7 @@
               <a:t>” el ciclo seria infinito pero añadimos la condición “</a:t>
             </a:r>
             <a:r>
-              <a:rPr lang="es-ES" b="1" dirty="0" err="1"/>
+              <a:rPr lang="es-ES" b="1" dirty="0"/>
               <a:t>if</a:t>
             </a:r>
             <a:r>
@@ -7086,13 +8110,8 @@
           <a:p>
             <a:r>
               <a:rPr lang="es-ES" dirty="0"/>
-              <a:t>Ciclo </a:t>
-            </a:r>
-            <a:r>
-              <a:rPr lang="es-ES" dirty="0" err="1"/>
-              <a:t>for</a:t>
-            </a:r>
-            <a:endParaRPr lang="es-ES" dirty="0"/>
+              <a:t>Ciclo for</a:t>
+            </a:r>
           </a:p>
         </p:txBody>
       </p:sp>

</xml_diff>